<commit_message>
deleted the pptx file
</commit_message>
<xml_diff>
--- a/quizathon.pptx
+++ b/quizathon.pptx
@@ -5,7 +5,7 @@
     <p:sldMasterId id="2147483689" r:id="rId1"/>
   </p:sldMasterIdLst>
   <p:handoutMasterIdLst>
-    <p:handoutMasterId r:id="rId8"/>
+    <p:handoutMasterId r:id="rId9"/>
   </p:handoutMasterIdLst>
   <p:sldIdLst>
     <p:sldId id="256" r:id="rId2"/>
@@ -14,6 +14,7 @@
     <p:sldId id="262" r:id="rId5"/>
     <p:sldId id="259" r:id="rId6"/>
     <p:sldId id="260" r:id="rId7"/>
+    <p:sldId id="263" r:id="rId8"/>
   </p:sldIdLst>
   <p:sldSz cx="9144000" cy="6858000" type="screen4x3"/>
   <p:notesSz cx="6858000" cy="9144000"/>
@@ -114,7 +115,7 @@
   </p:defaultTextStyle>
   <p:extLst>
     <p:ext uri="{EFAFB233-063F-42B5-8137-9DF3F51BA10A}">
-      <p15:sldGuideLst xmlns="" xmlns:p15="http://schemas.microsoft.com/office/powerpoint/2012/main">
+      <p15:sldGuideLst xmlns:p15="http://schemas.microsoft.com/office/powerpoint/2012/main">
         <p15:guide id="1" orient="horz" pos="2160">
           <p15:clr>
             <a:srgbClr val="A4A3A4"/>
@@ -128,7 +129,7 @@
       </p15:sldGuideLst>
     </p:ext>
     <p:ext uri="{2D200454-40CA-4A62-9FC3-DE9A4176ACB9}">
-      <p15:notesGuideLst xmlns="" xmlns:p15="http://schemas.microsoft.com/office/powerpoint/2012/main">
+      <p15:notesGuideLst xmlns:p15="http://schemas.microsoft.com/office/powerpoint/2012/main">
         <p15:guide id="1" orient="horz" pos="2880">
           <p15:clr>
             <a:srgbClr val="A4A3A4"/>
@@ -227,7 +228,7 @@
           <a:p>
             <a:fld id="{105C2527-5B26-4D11-8749-EC808F2540D1}" type="datetimeFigureOut">
               <a:rPr lang="en-US" smtClean="0"/>
-              <a:t>2016-04-29</a:t>
+              <a:t>5/2/2016</a:t>
             </a:fld>
             <a:endParaRPr lang="en-US"/>
           </a:p>
@@ -1104,7 +1105,7 @@
           <a:p>
             <a:fld id="{A22353D8-C0F8-41EC-936B-25E6DB207C91}" type="datetimeFigureOut">
               <a:rPr lang="en-US" smtClean="0"/>
-              <a:t>2016-04-29</a:t>
+              <a:t>5/2/2016</a:t>
             </a:fld>
             <a:endParaRPr lang="en-US"/>
           </a:p>
@@ -1355,7 +1356,7 @@
           <a:p>
             <a:fld id="{A22353D8-C0F8-41EC-936B-25E6DB207C91}" type="datetimeFigureOut">
               <a:rPr lang="en-US" smtClean="0"/>
-              <a:t>2016-04-29</a:t>
+              <a:t>5/2/2016</a:t>
             </a:fld>
             <a:endParaRPr lang="en-US"/>
           </a:p>
@@ -1669,7 +1670,7 @@
           <a:p>
             <a:fld id="{A22353D8-C0F8-41EC-936B-25E6DB207C91}" type="datetimeFigureOut">
               <a:rPr lang="en-US" smtClean="0"/>
-              <a:t>2016-04-29</a:t>
+              <a:t>5/2/2016</a:t>
             </a:fld>
             <a:endParaRPr lang="en-US"/>
           </a:p>
@@ -2002,7 +2003,7 @@
           <a:p>
             <a:fld id="{A22353D8-C0F8-41EC-936B-25E6DB207C91}" type="datetimeFigureOut">
               <a:rPr lang="en-US" smtClean="0"/>
-              <a:t>2016-04-29</a:t>
+              <a:t>5/2/2016</a:t>
             </a:fld>
             <a:endParaRPr lang="en-US"/>
           </a:p>
@@ -2316,7 +2317,7 @@
           <a:p>
             <a:fld id="{A22353D8-C0F8-41EC-936B-25E6DB207C91}" type="datetimeFigureOut">
               <a:rPr lang="en-US" smtClean="0"/>
-              <a:t>2016-04-29</a:t>
+              <a:t>5/2/2016</a:t>
             </a:fld>
             <a:endParaRPr lang="en-US"/>
           </a:p>
@@ -2709,7 +2710,7 @@
           <a:p>
             <a:fld id="{A22353D8-C0F8-41EC-936B-25E6DB207C91}" type="datetimeFigureOut">
               <a:rPr lang="en-US" smtClean="0"/>
-              <a:t>2016-04-29</a:t>
+              <a:t>5/2/2016</a:t>
             </a:fld>
             <a:endParaRPr lang="en-US"/>
           </a:p>
@@ -2879,7 +2880,7 @@
           <a:p>
             <a:fld id="{A22353D8-C0F8-41EC-936B-25E6DB207C91}" type="datetimeFigureOut">
               <a:rPr lang="en-US" smtClean="0"/>
-              <a:t>2016-04-29</a:t>
+              <a:t>5/2/2016</a:t>
             </a:fld>
             <a:endParaRPr lang="en-US"/>
           </a:p>
@@ -3059,7 +3060,7 @@
           <a:p>
             <a:fld id="{A22353D8-C0F8-41EC-936B-25E6DB207C91}" type="datetimeFigureOut">
               <a:rPr lang="en-US" smtClean="0"/>
-              <a:t>2016-04-29</a:t>
+              <a:t>5/2/2016</a:t>
             </a:fld>
             <a:endParaRPr lang="en-US"/>
           </a:p>
@@ -3224,7 +3225,7 @@
           <a:p>
             <a:fld id="{A22353D8-C0F8-41EC-936B-25E6DB207C91}" type="datetimeFigureOut">
               <a:rPr lang="en-US" smtClean="0"/>
-              <a:t>2016-04-29</a:t>
+              <a:t>5/2/2016</a:t>
             </a:fld>
             <a:endParaRPr lang="en-US"/>
           </a:p>
@@ -3544,7 +3545,7 @@
           <a:p>
             <a:fld id="{A22353D8-C0F8-41EC-936B-25E6DB207C91}" type="datetimeFigureOut">
               <a:rPr lang="en-US" smtClean="0"/>
-              <a:t>2016-04-29</a:t>
+              <a:t>5/2/2016</a:t>
             </a:fld>
             <a:endParaRPr lang="en-US"/>
           </a:p>
@@ -3841,7 +3842,7 @@
           <a:p>
             <a:fld id="{A22353D8-C0F8-41EC-936B-25E6DB207C91}" type="datetimeFigureOut">
               <a:rPr lang="en-US" smtClean="0"/>
-              <a:t>2016-04-29</a:t>
+              <a:t>5/2/2016</a:t>
             </a:fld>
             <a:endParaRPr lang="en-US"/>
           </a:p>
@@ -4220,7 +4221,7 @@
           <a:p>
             <a:fld id="{A22353D8-C0F8-41EC-936B-25E6DB207C91}" type="datetimeFigureOut">
               <a:rPr lang="en-US" smtClean="0"/>
-              <a:t>2016-04-29</a:t>
+              <a:t>5/2/2016</a:t>
             </a:fld>
             <a:endParaRPr lang="en-US"/>
           </a:p>
@@ -4343,7 +4344,7 @@
           <a:p>
             <a:fld id="{A22353D8-C0F8-41EC-936B-25E6DB207C91}" type="datetimeFigureOut">
               <a:rPr lang="en-US" smtClean="0"/>
-              <a:t>2016-04-29</a:t>
+              <a:t>5/2/2016</a:t>
             </a:fld>
             <a:endParaRPr lang="en-US"/>
           </a:p>
@@ -4438,7 +4439,7 @@
           <a:p>
             <a:fld id="{A22353D8-C0F8-41EC-936B-25E6DB207C91}" type="datetimeFigureOut">
               <a:rPr lang="en-US" smtClean="0"/>
-              <a:t>2016-04-29</a:t>
+              <a:t>5/2/2016</a:t>
             </a:fld>
             <a:endParaRPr lang="en-US"/>
           </a:p>
@@ -4693,7 +4694,7 @@
           <a:p>
             <a:fld id="{A22353D8-C0F8-41EC-936B-25E6DB207C91}" type="datetimeFigureOut">
               <a:rPr lang="en-US" smtClean="0"/>
-              <a:t>2016-04-29</a:t>
+              <a:t>5/2/2016</a:t>
             </a:fld>
             <a:endParaRPr lang="en-US"/>
           </a:p>
@@ -4956,7 +4957,7 @@
           <a:p>
             <a:fld id="{A22353D8-C0F8-41EC-936B-25E6DB207C91}" type="datetimeFigureOut">
               <a:rPr lang="en-US" smtClean="0"/>
-              <a:t>2016-04-29</a:t>
+              <a:t>5/2/2016</a:t>
             </a:fld>
             <a:endParaRPr lang="en-US"/>
           </a:p>
@@ -5770,7 +5771,7 @@
           <a:p>
             <a:fld id="{A22353D8-C0F8-41EC-936B-25E6DB207C91}" type="datetimeFigureOut">
               <a:rPr lang="en-US" smtClean="0"/>
-              <a:t>2016-04-29</a:t>
+              <a:t>5/2/2016</a:t>
             </a:fld>
             <a:endParaRPr lang="en-US"/>
           </a:p>
@@ -6923,11 +6924,7 @@
           <a:p>
             <a:r>
               <a:rPr lang="en-US" sz="2400" dirty="0" smtClean="0"/>
-              <a:t>In the current version it’s a web app designed for hackathon participants and supporters, however it’s highly scalable and portable and the usage options are endless</a:t>
-            </a:r>
-            <a:r>
-              <a:rPr lang="en-US" sz="2400" dirty="0" smtClean="0"/>
-              <a:t>.</a:t>
+              <a:t>In the current version it’s a web app designed for hackathon participants and supporters, however it’s highly scalable and portable and the usage options are endless.</a:t>
             </a:r>
             <a:endParaRPr lang="pl-PL" sz="2400" dirty="0" smtClean="0"/>
           </a:p>
@@ -7096,7 +7093,6 @@
               <a:rPr lang="pl-PL" sz="2600" dirty="0" smtClean="0"/>
               <a:t>All final results are shown from 0-100 points - based on a calculation for selected set of questions.   </a:t>
             </a:r>
-            <a:endParaRPr lang="pl-PL" sz="2600" dirty="0" smtClean="0"/>
           </a:p>
           <a:p>
             <a:endParaRPr lang="pl-PL" sz="2600" dirty="0"/>
@@ -7114,12 +7110,26 @@
               <a:t>Link: </a:t>
             </a:r>
             <a:r>
-              <a:rPr lang="en-US" sz="2800" u="sng" dirty="0">
-                <a:hlinkClick r:id="rId2"/>
+              <a:rPr lang="en-US" sz="2700" b="1" u="sng" dirty="0" smtClean="0">
+                <a:solidFill>
+                  <a:srgbClr val="92D050"/>
+                </a:solidFill>
               </a:rPr>
-              <a:t>http://hydnbk122146:3000/</a:t>
-            </a:r>
-            <a:endParaRPr lang="en-US" sz="2800" dirty="0"/>
+              <a:t>http</a:t>
+            </a:r>
+            <a:r>
+              <a:rPr lang="en-US" sz="2700" b="1" u="sng" dirty="0">
+                <a:solidFill>
+                  <a:srgbClr val="92D050"/>
+                </a:solidFill>
+              </a:rPr>
+              <a:t>://team6.hackathon.fti-projects.com:3210/</a:t>
+            </a:r>
+            <a:endParaRPr lang="en-US" sz="2700" b="1" u="sng" dirty="0">
+              <a:solidFill>
+                <a:srgbClr val="92D050"/>
+              </a:solidFill>
+            </a:endParaRPr>
           </a:p>
           <a:p>
             <a:endParaRPr lang="en-US" sz="2600" dirty="0" smtClean="0"/>
@@ -7765,6 +7775,139 @@
     <p:extLst>
       <p:ext uri="{BB962C8B-B14F-4D97-AF65-F5344CB8AC3E}">
         <p14:creationId xmlns:p14="http://schemas.microsoft.com/office/powerpoint/2010/main" val="3281298169"/>
+      </p:ext>
+    </p:extLst>
+  </p:cSld>
+  <p:clrMapOvr>
+    <a:masterClrMapping/>
+  </p:clrMapOvr>
+  <p:timing>
+    <p:tnLst>
+      <p:par>
+        <p:cTn id="1" dur="indefinite" restart="never" nodeType="tmRoot"/>
+      </p:par>
+    </p:tnLst>
+  </p:timing>
+</p:sld>
+</file>
+
+<file path=ppt/slides/slide7.xml><?xml version="1.0" encoding="utf-8"?>
+<p:sld xmlns:a="http://schemas.openxmlformats.org/drawingml/2006/main" xmlns:r="http://schemas.openxmlformats.org/officeDocument/2006/relationships" xmlns:p="http://schemas.openxmlformats.org/presentationml/2006/main">
+  <p:cSld>
+    <p:spTree>
+      <p:nvGrpSpPr>
+        <p:cNvPr id="1" name=""/>
+        <p:cNvGrpSpPr/>
+        <p:nvPr/>
+      </p:nvGrpSpPr>
+      <p:grpSpPr>
+        <a:xfrm>
+          <a:off x="0" y="0"/>
+          <a:ext cx="0" cy="0"/>
+          <a:chOff x="0" y="0"/>
+          <a:chExt cx="0" cy="0"/>
+        </a:xfrm>
+      </p:grpSpPr>
+      <p:pic>
+        <p:nvPicPr>
+          <p:cNvPr id="2" name="Picture 1"/>
+          <p:cNvPicPr>
+            <a:picLocks noChangeAspect="1"/>
+          </p:cNvPicPr>
+          <p:nvPr/>
+        </p:nvPicPr>
+        <p:blipFill>
+          <a:blip r:embed="rId2"/>
+          <a:stretch>
+            <a:fillRect/>
+          </a:stretch>
+        </p:blipFill>
+        <p:spPr>
+          <a:xfrm>
+            <a:off x="611560" y="476672"/>
+            <a:ext cx="1533498" cy="2713112"/>
+          </a:xfrm>
+          <a:prstGeom prst="rect">
+            <a:avLst/>
+          </a:prstGeom>
+        </p:spPr>
+      </p:pic>
+      <p:pic>
+        <p:nvPicPr>
+          <p:cNvPr id="3" name="Picture 2"/>
+          <p:cNvPicPr>
+            <a:picLocks noChangeAspect="1"/>
+          </p:cNvPicPr>
+          <p:nvPr/>
+        </p:nvPicPr>
+        <p:blipFill>
+          <a:blip r:embed="rId3"/>
+          <a:stretch>
+            <a:fillRect/>
+          </a:stretch>
+        </p:blipFill>
+        <p:spPr>
+          <a:xfrm>
+            <a:off x="2459863" y="476673"/>
+            <a:ext cx="1536073" cy="2713112"/>
+          </a:xfrm>
+          <a:prstGeom prst="rect">
+            <a:avLst/>
+          </a:prstGeom>
+        </p:spPr>
+      </p:pic>
+      <p:pic>
+        <p:nvPicPr>
+          <p:cNvPr id="4" name="Picture 3"/>
+          <p:cNvPicPr>
+            <a:picLocks noChangeAspect="1"/>
+          </p:cNvPicPr>
+          <p:nvPr/>
+        </p:nvPicPr>
+        <p:blipFill>
+          <a:blip r:embed="rId4"/>
+          <a:stretch>
+            <a:fillRect/>
+          </a:stretch>
+        </p:blipFill>
+        <p:spPr>
+          <a:xfrm>
+            <a:off x="4250114" y="484245"/>
+            <a:ext cx="1546022" cy="2705539"/>
+          </a:xfrm>
+          <a:prstGeom prst="rect">
+            <a:avLst/>
+          </a:prstGeom>
+        </p:spPr>
+      </p:pic>
+      <p:pic>
+        <p:nvPicPr>
+          <p:cNvPr id="5" name="Picture 4"/>
+          <p:cNvPicPr>
+            <a:picLocks noChangeAspect="1"/>
+          </p:cNvPicPr>
+          <p:nvPr/>
+        </p:nvPicPr>
+        <p:blipFill>
+          <a:blip r:embed="rId5"/>
+          <a:stretch>
+            <a:fillRect/>
+          </a:stretch>
+        </p:blipFill>
+        <p:spPr>
+          <a:xfrm>
+            <a:off x="586312" y="3501008"/>
+            <a:ext cx="1558746" cy="2705539"/>
+          </a:xfrm>
+          <a:prstGeom prst="rect">
+            <a:avLst/>
+          </a:prstGeom>
+        </p:spPr>
+      </p:pic>
+    </p:spTree>
+    <p:extLst>
+      <p:ext uri="{BB962C8B-B14F-4D97-AF65-F5344CB8AC3E}">
+        <p14:creationId xmlns:p14="http://schemas.microsoft.com/office/powerpoint/2010/main" val="1198719170"/>
       </p:ext>
     </p:extLst>
   </p:cSld>
@@ -8032,7 +8175,7 @@
   <a:extraClrSchemeLst/>
   <a:extLst>
     <a:ext uri="{05A4C25C-085E-4340-85A3-A5531E510DB2}">
-      <thm15:themeFamily xmlns="" xmlns:thm15="http://schemas.microsoft.com/office/thememl/2012/main" name="Facet" id="{C0C680CD-088A-49FC-A102-D699147F32B2}" vid="{CFBC31BA-B70F-4F30-BCAA-4F3011E16C4D}"/>
+      <thm15:themeFamily xmlns:thm15="http://schemas.microsoft.com/office/thememl/2012/main" name="Facet" id="{C0C680CD-088A-49FC-A102-D699147F32B2}" vid="{CFBC31BA-B70F-4F30-BCAA-4F3011E16C4D}"/>
     </a:ext>
   </a:extLst>
 </a:theme>

</xml_diff>